<commit_message>
docs(presentation): V1 of the presentation
</commit_message>
<xml_diff>
--- a/docs/Detección de plagio de código fuente mediante inteligencia.pptx
+++ b/docs/Detección de plagio de código fuente mediante inteligencia.pptx
@@ -108,6 +108,11 @@
       </a:defRPr>
     </a:lvl9pPr>
   </p:defaultTextStyle>
+  <p:extLst>
+    <p:ext uri="{EFAFB233-063F-42B5-8137-9DF3F51BA10A}">
+      <p15:sldGuideLst xmlns:p15="http://schemas.microsoft.com/office/powerpoint/2012/main"/>
+    </p:ext>
+  </p:extLst>
 </p:presentation>
 </file>
 
@@ -4595,6 +4600,14 @@
 <file path=ppt/slides/slide4.xml><?xml version="1.0" encoding="utf-8"?>
 <p:sld xmlns:a="http://schemas.openxmlformats.org/drawingml/2006/main" xmlns:r="http://schemas.openxmlformats.org/officeDocument/2006/relationships" xmlns:p="http://schemas.openxmlformats.org/presentationml/2006/main">
   <p:cSld>
+    <p:bg>
+      <p:bgPr>
+        <a:solidFill>
+          <a:schemeClr val="bg1"/>
+        </a:solidFill>
+        <a:effectLst/>
+      </p:bgPr>
+    </p:bg>
     <p:spTree>
       <p:nvGrpSpPr>
         <p:cNvPr id="1" name=""/>
@@ -4609,6 +4622,82 @@
           <a:chExt cx="0" cy="0"/>
         </a:xfrm>
       </p:grpSpPr>
+      <p:sp useBgFill="1">
+        <p:nvSpPr>
+          <p:cNvPr id="10" name="Rectangle 9">
+            <a:extLst>
+              <a:ext uri="{FF2B5EF4-FFF2-40B4-BE49-F238E27FC236}">
+                <a16:creationId xmlns:a16="http://schemas.microsoft.com/office/drawing/2014/main" id="{744CAA32-F237-419C-A2DD-43C28D920D3C}"/>
+              </a:ext>
+              <a:ext uri="{C183D7F6-B498-43B3-948B-1728B52AA6E4}">
+                <adec:decorative xmlns:adec="http://schemas.microsoft.com/office/drawing/2017/decorative" val="1"/>
+              </a:ext>
+            </a:extLst>
+          </p:cNvPr>
+          <p:cNvSpPr>
+            <a:spLocks noGrp="1" noRot="1" noChangeAspect="1" noMove="1" noResize="1" noEditPoints="1" noAdjustHandles="1" noChangeArrowheads="1" noChangeShapeType="1" noTextEdit="1"/>
+          </p:cNvSpPr>
+          <p:nvPr>
+            <p:extLst>
+              <p:ext uri="{386F3935-93C4-4BCD-93E2-E3B085C9AB24}">
+                <p16:designElem xmlns:p16="http://schemas.microsoft.com/office/powerpoint/2015/main" val="1"/>
+              </p:ext>
+            </p:extLst>
+          </p:nvPr>
+        </p:nvSpPr>
+        <p:spPr>
+          <a:xfrm>
+            <a:off x="0" y="0"/>
+            <a:ext cx="12192000" cy="6858000"/>
+          </a:xfrm>
+          <a:prstGeom prst="rect">
+            <a:avLst/>
+          </a:prstGeom>
+          <a:ln w="12700" cap="flat" cmpd="sng" algn="ctr">
+            <a:noFill/>
+            <a:prstDash val="solid"/>
+            <a:miter lim="800000"/>
+          </a:ln>
+          <a:effectLst/>
+          <a:extLst>
+            <a:ext uri="{91240B29-F687-4F45-9708-019B960494DF}">
+              <a14:hiddenLine xmlns:a14="http://schemas.microsoft.com/office/drawing/2010/main" w="12700" cap="flat" cmpd="sng" algn="ctr">
+                <a:solidFill>
+                  <a:schemeClr val="accent1">
+                    <a:shade val="50000"/>
+                  </a:schemeClr>
+                </a:solidFill>
+                <a:prstDash val="solid"/>
+                <a:miter lim="800000"/>
+              </a14:hiddenLine>
+            </a:ext>
+          </a:extLst>
+        </p:spPr>
+        <p:style>
+          <a:lnRef idx="2">
+            <a:schemeClr val="accent1">
+              <a:shade val="50000"/>
+            </a:schemeClr>
+          </a:lnRef>
+          <a:fillRef idx="1">
+            <a:schemeClr val="accent1"/>
+          </a:fillRef>
+          <a:effectRef idx="0">
+            <a:schemeClr val="accent1"/>
+          </a:effectRef>
+          <a:fontRef idx="minor">
+            <a:schemeClr val="lt1"/>
+          </a:fontRef>
+        </p:style>
+        <p:txBody>
+          <a:bodyPr rtlCol="0" anchor="ctr"/>
+          <a:lstStyle/>
+          <a:p>
+            <a:pPr algn="ctr"/>
+            <a:endParaRPr lang="en-US"/>
+          </a:p>
+        </p:txBody>
+      </p:sp>
       <p:sp>
         <p:nvSpPr>
           <p:cNvPr id="2" name="Título 1">
@@ -4625,40 +4714,146 @@
             <p:ph type="title"/>
           </p:nvPr>
         </p:nvSpPr>
-        <p:spPr/>
-        <p:txBody>
-          <a:bodyPr/>
+        <p:spPr>
+          <a:xfrm>
+            <a:off x="7269904" y="914400"/>
+            <a:ext cx="4261104" cy="1097280"/>
+          </a:xfrm>
+        </p:spPr>
+        <p:txBody>
+          <a:bodyPr anchor="t">
+            <a:normAutofit/>
+          </a:bodyPr>
+          <a:lstStyle/>
+          <a:p>
+            <a:r>
+              <a:rPr lang="es-MX" sz="3600"/>
+              <a:t>Resultados</a:t>
+            </a:r>
+          </a:p>
+        </p:txBody>
+      </p:sp>
+      <p:pic>
+        <p:nvPicPr>
+          <p:cNvPr id="5" name="Imagen 4" descr="Gráfico, Gráfico de rectángulos&#10;&#10;Descripción generada automáticamente">
+            <a:extLst>
+              <a:ext uri="{FF2B5EF4-FFF2-40B4-BE49-F238E27FC236}">
+                <a16:creationId xmlns:a16="http://schemas.microsoft.com/office/drawing/2014/main" id="{9B0333FB-CA85-E9F4-7963-6C9CE88F2263}"/>
+              </a:ext>
+            </a:extLst>
+          </p:cNvPr>
+          <p:cNvPicPr>
+            <a:picLocks noChangeAspect="1"/>
+          </p:cNvPicPr>
+          <p:nvPr/>
+        </p:nvPicPr>
+        <p:blipFill>
+          <a:blip r:embed="rId2"/>
+          <a:srcRect l="3937" t="1653" r="3" b="3"/>
+          <a:stretch/>
+        </p:blipFill>
+        <p:spPr>
+          <a:xfrm>
+            <a:off x="147484" y="1002890"/>
+            <a:ext cx="6509770" cy="5265031"/>
+          </a:xfrm>
+          <a:prstGeom prst="rect">
+            <a:avLst/>
+          </a:prstGeom>
+        </p:spPr>
+      </p:pic>
+      <p:cxnSp>
+        <p:nvCxnSpPr>
+          <p:cNvPr id="12" name="Straight Connector 11">
+            <a:extLst>
+              <a:ext uri="{FF2B5EF4-FFF2-40B4-BE49-F238E27FC236}">
+                <a16:creationId xmlns:a16="http://schemas.microsoft.com/office/drawing/2014/main" id="{08052531-D50B-3899-B150-D05525F4F2BC}"/>
+              </a:ext>
+              <a:ext uri="{C183D7F6-B498-43B3-948B-1728B52AA6E4}">
+                <adec:decorative xmlns:adec="http://schemas.microsoft.com/office/drawing/2017/decorative" val="1"/>
+              </a:ext>
+            </a:extLst>
+          </p:cNvPr>
+          <p:cNvCxnSpPr>
+            <a:cxnSpLocks noGrp="1" noRot="1" noChangeAspect="1" noMove="1" noResize="1" noEditPoints="1" noAdjustHandles="1" noChangeArrowheads="1" noChangeShapeType="1"/>
+          </p:cNvCxnSpPr>
+          <p:nvPr>
+            <p:extLst>
+              <p:ext uri="{386F3935-93C4-4BCD-93E2-E3B085C9AB24}">
+                <p16:designElem xmlns:p16="http://schemas.microsoft.com/office/powerpoint/2015/main" val="1"/>
+              </p:ext>
+            </p:extLst>
+          </p:nvPr>
+        </p:nvCxnSpPr>
+        <p:spPr>
+          <a:xfrm flipV="1">
+            <a:off x="0" y="6267922"/>
+            <a:ext cx="6656832" cy="1"/>
+          </a:xfrm>
+          <a:prstGeom prst="line">
+            <a:avLst/>
+          </a:prstGeom>
+          <a:ln w="76200"/>
+        </p:spPr>
+        <p:style>
+          <a:lnRef idx="1">
+            <a:schemeClr val="accent1"/>
+          </a:lnRef>
+          <a:fillRef idx="0">
+            <a:schemeClr val="accent1"/>
+          </a:fillRef>
+          <a:effectRef idx="0">
+            <a:schemeClr val="accent1"/>
+          </a:effectRef>
+          <a:fontRef idx="minor">
+            <a:schemeClr val="tx1"/>
+          </a:fontRef>
+        </p:style>
+      </p:cxnSp>
+      <p:sp>
+        <p:nvSpPr>
+          <p:cNvPr id="3" name="Marcador de contenido 2">
+            <a:extLst>
+              <a:ext uri="{FF2B5EF4-FFF2-40B4-BE49-F238E27FC236}">
+                <a16:creationId xmlns:a16="http://schemas.microsoft.com/office/drawing/2014/main" id="{9CFCA433-B785-2AE2-D299-1FE6B507F49F}"/>
+              </a:ext>
+            </a:extLst>
+          </p:cNvPr>
+          <p:cNvSpPr>
+            <a:spLocks noGrp="1"/>
+          </p:cNvSpPr>
+          <p:nvPr>
+            <p:ph idx="1"/>
+          </p:nvPr>
+        </p:nvSpPr>
+        <p:spPr>
+          <a:xfrm>
+            <a:off x="7269905" y="2176036"/>
+            <a:ext cx="4261104" cy="4121887"/>
+          </a:xfrm>
+        </p:spPr>
+        <p:txBody>
+          <a:bodyPr>
+            <a:normAutofit/>
+          </a:bodyPr>
           <a:lstStyle/>
           <a:p>
             <a:r>
               <a:rPr lang="es-MX" dirty="0"/>
-              <a:t>Resultados</a:t>
-            </a:r>
-          </a:p>
-        </p:txBody>
-      </p:sp>
-      <p:sp>
-        <p:nvSpPr>
-          <p:cNvPr id="3" name="Marcador de contenido 2">
-            <a:extLst>
-              <a:ext uri="{FF2B5EF4-FFF2-40B4-BE49-F238E27FC236}">
-                <a16:creationId xmlns:a16="http://schemas.microsoft.com/office/drawing/2014/main" id="{9CFCA433-B785-2AE2-D299-1FE6B507F49F}"/>
-              </a:ext>
-            </a:extLst>
-          </p:cNvPr>
-          <p:cNvSpPr>
-            <a:spLocks noGrp="1"/>
-          </p:cNvSpPr>
-          <p:nvPr>
-            <p:ph idx="1"/>
-          </p:nvPr>
-        </p:nvSpPr>
-        <p:spPr/>
-        <p:txBody>
-          <a:bodyPr/>
-          <a:lstStyle/>
-          <a:p>
-            <a:endParaRPr lang="es-MX"/>
+              <a:t>Con Plagio: 85/118 → 72.03%</a:t>
+            </a:r>
+          </a:p>
+          <a:p>
+            <a:r>
+              <a:rPr lang="es-MX" dirty="0"/>
+              <a:t>Sin Plagio: 92/149 → 61.74%</a:t>
+            </a:r>
+          </a:p>
+          <a:p>
+            <a:r>
+              <a:rPr lang="es-MX" dirty="0"/>
+              <a:t>Precisión: 65.17%</a:t>
+            </a:r>
           </a:p>
         </p:txBody>
       </p:sp>
@@ -4678,6 +4873,14 @@
 <file path=ppt/slides/slide5.xml><?xml version="1.0" encoding="utf-8"?>
 <p:sld xmlns:a="http://schemas.openxmlformats.org/drawingml/2006/main" xmlns:r="http://schemas.openxmlformats.org/officeDocument/2006/relationships" xmlns:p="http://schemas.openxmlformats.org/presentationml/2006/main">
   <p:cSld>
+    <p:bg>
+      <p:bgPr>
+        <a:solidFill>
+          <a:schemeClr val="bg1"/>
+        </a:solidFill>
+        <a:effectLst/>
+      </p:bgPr>
+    </p:bg>
     <p:spTree>
       <p:nvGrpSpPr>
         <p:cNvPr id="1" name=""/>
@@ -4692,6 +4895,130 @@
           <a:chExt cx="0" cy="0"/>
         </a:xfrm>
       </p:grpSpPr>
+      <p:cxnSp>
+        <p:nvCxnSpPr>
+          <p:cNvPr id="32" name="Straight Connector 31">
+            <a:extLst>
+              <a:ext uri="{FF2B5EF4-FFF2-40B4-BE49-F238E27FC236}">
+                <a16:creationId xmlns:a16="http://schemas.microsoft.com/office/drawing/2014/main" id="{118E06E4-607B-144B-382B-AD3D06B1EE8C}"/>
+              </a:ext>
+              <a:ext uri="{C183D7F6-B498-43B3-948B-1728B52AA6E4}">
+                <adec:decorative xmlns:adec="http://schemas.microsoft.com/office/drawing/2017/decorative" val="1"/>
+              </a:ext>
+            </a:extLst>
+          </p:cNvPr>
+          <p:cNvCxnSpPr>
+            <a:cxnSpLocks noGrp="1" noRot="1" noChangeAspect="1" noMove="1" noResize="1" noEditPoints="1" noAdjustHandles="1" noChangeArrowheads="1" noChangeShapeType="1"/>
+          </p:cNvCxnSpPr>
+          <p:nvPr>
+            <p:extLst>
+              <p:ext uri="{386F3935-93C4-4BCD-93E2-E3B085C9AB24}">
+                <p16:designElem xmlns:p16="http://schemas.microsoft.com/office/powerpoint/2015/main" val="1"/>
+              </p:ext>
+            </p:extLst>
+          </p:nvPr>
+        </p:nvCxnSpPr>
+        <p:spPr>
+          <a:xfrm>
+            <a:off x="713232" y="1031001"/>
+            <a:ext cx="978862" cy="0"/>
+          </a:xfrm>
+          <a:prstGeom prst="line">
+            <a:avLst/>
+          </a:prstGeom>
+          <a:ln w="76200"/>
+        </p:spPr>
+        <p:style>
+          <a:lnRef idx="1">
+            <a:schemeClr val="accent1"/>
+          </a:lnRef>
+          <a:fillRef idx="0">
+            <a:schemeClr val="accent1"/>
+          </a:fillRef>
+          <a:effectRef idx="0">
+            <a:schemeClr val="accent1"/>
+          </a:effectRef>
+          <a:fontRef idx="minor">
+            <a:schemeClr val="tx1"/>
+          </a:fontRef>
+        </p:style>
+      </p:cxnSp>
+      <p:sp useBgFill="1">
+        <p:nvSpPr>
+          <p:cNvPr id="34" name="Rectangle 33">
+            <a:extLst>
+              <a:ext uri="{FF2B5EF4-FFF2-40B4-BE49-F238E27FC236}">
+                <a16:creationId xmlns:a16="http://schemas.microsoft.com/office/drawing/2014/main" id="{19F9BF86-FE94-4517-B97D-026C7515E589}"/>
+              </a:ext>
+              <a:ext uri="{C183D7F6-B498-43B3-948B-1728B52AA6E4}">
+                <adec:decorative xmlns:adec="http://schemas.microsoft.com/office/drawing/2017/decorative" val="1"/>
+              </a:ext>
+            </a:extLst>
+          </p:cNvPr>
+          <p:cNvSpPr>
+            <a:spLocks noGrp="1" noRot="1" noChangeAspect="1" noMove="1" noResize="1" noEditPoints="1" noAdjustHandles="1" noChangeArrowheads="1" noChangeShapeType="1" noTextEdit="1"/>
+          </p:cNvSpPr>
+          <p:nvPr>
+            <p:extLst>
+              <p:ext uri="{386F3935-93C4-4BCD-93E2-E3B085C9AB24}">
+                <p16:designElem xmlns:p16="http://schemas.microsoft.com/office/powerpoint/2015/main" val="1"/>
+              </p:ext>
+            </p:extLst>
+          </p:nvPr>
+        </p:nvSpPr>
+        <p:spPr>
+          <a:xfrm>
+            <a:off x="0" y="0"/>
+            <a:ext cx="12192000" cy="6858000"/>
+          </a:xfrm>
+          <a:prstGeom prst="rect">
+            <a:avLst/>
+          </a:prstGeom>
+          <a:ln w="12700" cap="flat" cmpd="sng" algn="ctr">
+            <a:noFill/>
+            <a:prstDash val="solid"/>
+            <a:miter lim="800000"/>
+          </a:ln>
+          <a:effectLst/>
+          <a:extLst>
+            <a:ext uri="{91240B29-F687-4F45-9708-019B960494DF}">
+              <a14:hiddenLine xmlns:a14="http://schemas.microsoft.com/office/drawing/2010/main" w="12700" cap="flat" cmpd="sng" algn="ctr">
+                <a:solidFill>
+                  <a:schemeClr val="accent1">
+                    <a:shade val="50000"/>
+                  </a:schemeClr>
+                </a:solidFill>
+                <a:prstDash val="solid"/>
+                <a:miter lim="800000"/>
+              </a14:hiddenLine>
+            </a:ext>
+          </a:extLst>
+        </p:spPr>
+        <p:style>
+          <a:lnRef idx="2">
+            <a:schemeClr val="accent1">
+              <a:shade val="50000"/>
+            </a:schemeClr>
+          </a:lnRef>
+          <a:fillRef idx="1">
+            <a:schemeClr val="accent1"/>
+          </a:fillRef>
+          <a:effectRef idx="0">
+            <a:schemeClr val="accent1"/>
+          </a:effectRef>
+          <a:fontRef idx="minor">
+            <a:schemeClr val="lt1"/>
+          </a:fontRef>
+        </p:style>
+        <p:txBody>
+          <a:bodyPr rtlCol="0" anchor="ctr"/>
+          <a:lstStyle/>
+          <a:p>
+            <a:pPr algn="ctr"/>
+            <a:endParaRPr lang="en-US" dirty="0"/>
+          </a:p>
+        </p:txBody>
+      </p:sp>
       <p:sp>
         <p:nvSpPr>
           <p:cNvPr id="2" name="Título 1">
@@ -4708,47 +5035,260 @@
             <p:ph type="title"/>
           </p:nvPr>
         </p:nvSpPr>
-        <p:spPr/>
-        <p:txBody>
-          <a:bodyPr/>
-          <a:lstStyle/>
-          <a:p>
-            <a:r>
-              <a:rPr lang="es-MX" dirty="0"/>
-              <a:t>Comparación con </a:t>
-            </a:r>
-            <a:r>
-              <a:rPr lang="es-MX"/>
-              <a:t>otras soluciones</a:t>
-            </a:r>
-          </a:p>
-        </p:txBody>
-      </p:sp>
-      <p:sp>
-        <p:nvSpPr>
-          <p:cNvPr id="3" name="Marcador de contenido 2">
-            <a:extLst>
-              <a:ext uri="{FF2B5EF4-FFF2-40B4-BE49-F238E27FC236}">
-                <a16:creationId xmlns:a16="http://schemas.microsoft.com/office/drawing/2014/main" id="{979ACAF0-154E-492E-6FDA-2E56BCC0D442}"/>
-              </a:ext>
-            </a:extLst>
-          </p:cNvPr>
-          <p:cNvSpPr>
-            <a:spLocks noGrp="1"/>
-          </p:cNvSpPr>
-          <p:nvPr>
-            <p:ph idx="1"/>
-          </p:nvPr>
-        </p:nvSpPr>
-        <p:spPr/>
-        <p:txBody>
-          <a:bodyPr/>
-          <a:lstStyle/>
-          <a:p>
-            <a:endParaRPr lang="es-MX"/>
-          </a:p>
-        </p:txBody>
-      </p:sp>
+        <p:spPr>
+          <a:xfrm>
+            <a:off x="640079" y="1021842"/>
+            <a:ext cx="3156857" cy="2642616"/>
+          </a:xfrm>
+        </p:spPr>
+        <p:txBody>
+          <a:bodyPr vert="horz" lIns="91440" tIns="45720" rIns="91440" bIns="45720" rtlCol="0" anchor="b">
+            <a:normAutofit/>
+          </a:bodyPr>
+          <a:lstStyle/>
+          <a:p>
+            <a:r>
+              <a:rPr lang="en-US" sz="4400"/>
+              <a:t>Ventaja con otras soluciones</a:t>
+            </a:r>
+          </a:p>
+        </p:txBody>
+      </p:sp>
+      <p:cxnSp>
+        <p:nvCxnSpPr>
+          <p:cNvPr id="36" name="Straight Connector 35">
+            <a:extLst>
+              <a:ext uri="{FF2B5EF4-FFF2-40B4-BE49-F238E27FC236}">
+                <a16:creationId xmlns:a16="http://schemas.microsoft.com/office/drawing/2014/main" id="{750527CE-FCD0-40C8-B37A-39331C2A4FDF}"/>
+              </a:ext>
+              <a:ext uri="{C183D7F6-B498-43B3-948B-1728B52AA6E4}">
+                <adec:decorative xmlns:adec="http://schemas.microsoft.com/office/drawing/2017/decorative" val="1"/>
+              </a:ext>
+            </a:extLst>
+          </p:cNvPr>
+          <p:cNvCxnSpPr>
+            <a:cxnSpLocks noGrp="1" noRot="1" noChangeAspect="1" noMove="1" noResize="1" noEditPoints="1" noAdjustHandles="1" noChangeArrowheads="1" noChangeShapeType="1"/>
+          </p:cNvCxnSpPr>
+          <p:nvPr>
+            <p:extLst>
+              <p:ext uri="{386F3935-93C4-4BCD-93E2-E3B085C9AB24}">
+                <p16:designElem xmlns:p16="http://schemas.microsoft.com/office/powerpoint/2015/main" val="1"/>
+              </p:ext>
+            </p:extLst>
+          </p:nvPr>
+        </p:nvCxnSpPr>
+        <p:spPr>
+          <a:xfrm>
+            <a:off x="713232" y="4011930"/>
+            <a:ext cx="978862" cy="0"/>
+          </a:xfrm>
+          <a:prstGeom prst="line">
+            <a:avLst/>
+          </a:prstGeom>
+          <a:ln w="76200"/>
+        </p:spPr>
+        <p:style>
+          <a:lnRef idx="1">
+            <a:schemeClr val="accent1"/>
+          </a:lnRef>
+          <a:fillRef idx="0">
+            <a:schemeClr val="accent1"/>
+          </a:fillRef>
+          <a:effectRef idx="0">
+            <a:schemeClr val="accent1"/>
+          </a:effectRef>
+          <a:fontRef idx="minor">
+            <a:schemeClr val="tx1"/>
+          </a:fontRef>
+        </p:style>
+      </p:cxnSp>
+      <p:graphicFrame>
+        <p:nvGraphicFramePr>
+          <p:cNvPr id="9" name="Tabla 8">
+            <a:extLst>
+              <a:ext uri="{FF2B5EF4-FFF2-40B4-BE49-F238E27FC236}">
+                <a16:creationId xmlns:a16="http://schemas.microsoft.com/office/drawing/2014/main" id="{E784EF71-8654-D4D7-EF3B-9DC823E1DB19}"/>
+              </a:ext>
+            </a:extLst>
+          </p:cNvPr>
+          <p:cNvGraphicFramePr>
+            <a:graphicFrameLocks noGrp="1"/>
+          </p:cNvGraphicFramePr>
+          <p:nvPr>
+            <p:extLst>
+              <p:ext uri="{D42A27DB-BD31-4B8C-83A1-F6EECF244321}">
+                <p14:modId xmlns:p14="http://schemas.microsoft.com/office/powerpoint/2010/main" val="3735737588"/>
+              </p:ext>
+            </p:extLst>
+          </p:nvPr>
+        </p:nvGraphicFramePr>
+        <p:xfrm>
+          <a:off x="4604641" y="1381641"/>
+          <a:ext cx="6876288" cy="4163298"/>
+        </p:xfrm>
+        <a:graphic>
+          <a:graphicData uri="http://schemas.openxmlformats.org/drawingml/2006/table">
+            <a:tbl>
+              <a:tblPr firstRow="1" bandRow="1">
+                <a:solidFill>
+                  <a:schemeClr val="tx1">
+                    <a:lumMod val="75000"/>
+                    <a:lumOff val="25000"/>
+                  </a:schemeClr>
+                </a:solidFill>
+                <a:tableStyleId>{5C22544A-7EE6-4342-B048-85BDC9FD1C3A}</a:tableStyleId>
+              </a:tblPr>
+              <a:tblGrid>
+                <a:gridCol w="6876288">
+                  <a:extLst>
+                    <a:ext uri="{9D8B030D-6E8A-4147-A177-3AD203B41FA5}">
+                      <a16:colId xmlns:a16="http://schemas.microsoft.com/office/drawing/2014/main" val="4208308208"/>
+                    </a:ext>
+                  </a:extLst>
+                </a:gridCol>
+              </a:tblGrid>
+              <a:tr h="932474">
+                <a:tc>
+                  <a:txBody>
+                    <a:bodyPr/>
+                    <a:lstStyle/>
+                    <a:p>
+                      <a:r>
+                        <a:rPr lang="es-MX" sz="3000" b="0" cap="none" spc="0">
+                          <a:solidFill>
+                            <a:schemeClr val="bg1"/>
+                          </a:solidFill>
+                        </a:rPr>
+                        <a:t>GNN Siamese</a:t>
+                      </a:r>
+                    </a:p>
+                  </a:txBody>
+                  <a:tcPr marL="256102" marR="90906" marT="197001" marB="197001" anchor="ctr">
+                    <a:lnL w="19050" cap="flat" cmpd="sng" algn="ctr">
+                      <a:solidFill>
+                        <a:schemeClr val="tx1"/>
+                      </a:solidFill>
+                      <a:prstDash val="solid"/>
+                    </a:lnL>
+                    <a:lnR w="12700" cmpd="sng">
+                      <a:noFill/>
+                    </a:lnR>
+                    <a:lnT w="19050" cap="flat" cmpd="sng" algn="ctr">
+                      <a:solidFill>
+                        <a:schemeClr val="tx1"/>
+                      </a:solidFill>
+                      <a:prstDash val="solid"/>
+                    </a:lnT>
+                    <a:lnB w="38100" cmpd="sng">
+                      <a:noFill/>
+                    </a:lnB>
+                    <a:solidFill>
+                      <a:schemeClr val="tx1"/>
+                    </a:solidFill>
+                  </a:tcPr>
+                </a:tc>
+                <a:extLst>
+                  <a:ext uri="{0D108BD9-81ED-4DB2-BD59-A6C34878D82A}">
+                    <a16:rowId xmlns:a16="http://schemas.microsoft.com/office/drawing/2014/main" val="165710401"/>
+                  </a:ext>
+                </a:extLst>
+              </a:tr>
+              <a:tr h="3230824">
+                <a:tc>
+                  <a:txBody>
+                    <a:bodyPr/>
+                    <a:lstStyle/>
+                    <a:p>
+                      <a:pPr marL="285750" indent="-285750">
+                        <a:buFont typeface="Arial" panose="020B0604020202020204" pitchFamily="34" charset="0"/>
+                        <a:buChar char="•"/>
+                      </a:pPr>
+                      <a:r>
+                        <a:rPr lang="es-MX" sz="3000" cap="none" spc="0">
+                          <a:solidFill>
+                            <a:schemeClr val="bg1"/>
+                          </a:solidFill>
+                        </a:rPr>
+                        <a:t>Extrae relaciones estructurales vía GNN</a:t>
+                      </a:r>
+                    </a:p>
+                    <a:p>
+                      <a:pPr marL="285750" indent="-285750">
+                        <a:buFont typeface="Arial" panose="020B0604020202020204" pitchFamily="34" charset="0"/>
+                        <a:buChar char="•"/>
+                      </a:pPr>
+                      <a:r>
+                        <a:rPr lang="es-MX" sz="3000" cap="none" spc="0">
+                          <a:solidFill>
+                            <a:schemeClr val="bg1"/>
+                          </a:solidFill>
+                        </a:rPr>
+                        <a:t>Compara directamente similitud entre códigos</a:t>
+                      </a:r>
+                    </a:p>
+                    <a:p>
+                      <a:pPr marL="285750" indent="-285750">
+                        <a:buFont typeface="Arial" panose="020B0604020202020204" pitchFamily="34" charset="0"/>
+                        <a:buChar char="•"/>
+                      </a:pPr>
+                      <a:r>
+                        <a:rPr lang="es-MX" sz="3000" cap="none" spc="0">
+                          <a:solidFill>
+                            <a:schemeClr val="bg1"/>
+                          </a:solidFill>
+                        </a:rPr>
+                        <a:t>Aprende patrones estructurales</a:t>
+                      </a:r>
+                    </a:p>
+                    <a:p>
+                      <a:pPr marL="285750" indent="-285750">
+                        <a:buFont typeface="Arial" panose="020B0604020202020204" pitchFamily="34" charset="0"/>
+                        <a:buChar char="•"/>
+                      </a:pPr>
+                      <a:r>
+                        <a:rPr lang="es-MX" sz="3000" cap="none" spc="0">
+                          <a:solidFill>
+                            <a:schemeClr val="bg1"/>
+                          </a:solidFill>
+                        </a:rPr>
+                        <a:t>Fácil de adaptar a otros grafos</a:t>
+                      </a:r>
+                    </a:p>
+                  </a:txBody>
+                  <a:tcPr marL="256102" marR="90906" marT="197001" marB="197001">
+                    <a:lnL w="38100" cap="flat" cmpd="sng" algn="ctr">
+                      <a:noFill/>
+                      <a:prstDash val="solid"/>
+                    </a:lnL>
+                    <a:lnR w="38100" cap="flat" cmpd="sng" algn="ctr">
+                      <a:noFill/>
+                      <a:prstDash val="solid"/>
+                    </a:lnR>
+                    <a:lnT w="38100" cmpd="sng">
+                      <a:noFill/>
+                    </a:lnT>
+                    <a:lnB w="38100" cap="flat" cmpd="sng" algn="ctr">
+                      <a:noFill/>
+                      <a:prstDash val="solid"/>
+                    </a:lnB>
+                    <a:solidFill>
+                      <a:schemeClr val="tx1">
+                        <a:lumMod val="75000"/>
+                        <a:lumOff val="25000"/>
+                      </a:schemeClr>
+                    </a:solidFill>
+                  </a:tcPr>
+                </a:tc>
+                <a:extLst>
+                  <a:ext uri="{0D108BD9-81ED-4DB2-BD59-A6C34878D82A}">
+                    <a16:rowId xmlns:a16="http://schemas.microsoft.com/office/drawing/2014/main" val="4240351068"/>
+                  </a:ext>
+                </a:extLst>
+              </a:tr>
+            </a:tbl>
+          </a:graphicData>
+        </a:graphic>
+      </p:graphicFrame>
     </p:spTree>
     <p:extLst>
       <p:ext uri="{BB962C8B-B14F-4D97-AF65-F5344CB8AC3E}">

</xml_diff>

<commit_message>
docs(presentation): V2 of presentation
</commit_message>
<xml_diff>
--- a/docs/Detección de plagio de código fuente mediante inteligencia.pptx
+++ b/docs/Detección de plagio de código fuente mediante inteligencia.pptx
@@ -4733,35 +4733,6 @@
           </a:p>
         </p:txBody>
       </p:sp>
-      <p:pic>
-        <p:nvPicPr>
-          <p:cNvPr id="5" name="Imagen 4" descr="Gráfico, Gráfico de rectángulos&#10;&#10;Descripción generada automáticamente">
-            <a:extLst>
-              <a:ext uri="{FF2B5EF4-FFF2-40B4-BE49-F238E27FC236}">
-                <a16:creationId xmlns:a16="http://schemas.microsoft.com/office/drawing/2014/main" id="{9B0333FB-CA85-E9F4-7963-6C9CE88F2263}"/>
-              </a:ext>
-            </a:extLst>
-          </p:cNvPr>
-          <p:cNvPicPr>
-            <a:picLocks noChangeAspect="1"/>
-          </p:cNvPicPr>
-          <p:nvPr/>
-        </p:nvPicPr>
-        <p:blipFill>
-          <a:blip r:embed="rId2"/>
-          <a:srcRect l="3937" t="1653" r="3" b="3"/>
-          <a:stretch/>
-        </p:blipFill>
-        <p:spPr>
-          <a:xfrm>
-            <a:off x="147484" y="1002890"/>
-            <a:ext cx="6509770" cy="5265031"/>
-          </a:xfrm>
-          <a:prstGeom prst="rect">
-            <a:avLst/>
-          </a:prstGeom>
-        </p:spPr>
-      </p:pic>
       <p:cxnSp>
         <p:nvCxnSpPr>
           <p:cNvPr id="12" name="Straight Connector 11">
@@ -4840,23 +4811,52 @@
           <a:p>
             <a:r>
               <a:rPr lang="es-MX" dirty="0"/>
-              <a:t>Con Plagio: 85/118 → 72.03%</a:t>
+              <a:t>Con Plagio: 85/117 → 72.64%</a:t>
             </a:r>
           </a:p>
           <a:p>
             <a:r>
               <a:rPr lang="es-MX" dirty="0"/>
-              <a:t>Sin Plagio: 92/149 → 61.74%</a:t>
+              <a:t>Sin Plagio: 115/150 → 76.66%</a:t>
             </a:r>
           </a:p>
           <a:p>
             <a:r>
               <a:rPr lang="es-MX" dirty="0"/>
-              <a:t>Precisión: 65.17%</a:t>
-            </a:r>
-          </a:p>
-        </p:txBody>
-      </p:sp>
+              <a:t>Precisión: 74.91%</a:t>
+            </a:r>
+          </a:p>
+        </p:txBody>
+      </p:sp>
+      <p:pic>
+        <p:nvPicPr>
+          <p:cNvPr id="6" name="Imagen 5">
+            <a:extLst>
+              <a:ext uri="{FF2B5EF4-FFF2-40B4-BE49-F238E27FC236}">
+                <a16:creationId xmlns:a16="http://schemas.microsoft.com/office/drawing/2014/main" id="{6FF0F741-733D-9BD1-AE36-F8E5886A33A3}"/>
+              </a:ext>
+            </a:extLst>
+          </p:cNvPr>
+          <p:cNvPicPr>
+            <a:picLocks noChangeAspect="1"/>
+          </p:cNvPicPr>
+          <p:nvPr/>
+        </p:nvPicPr>
+        <p:blipFill>
+          <a:blip r:embed="rId2"/>
+          <a:srcRect l="3000"/>
+          <a:stretch/>
+        </p:blipFill>
+        <p:spPr>
+          <a:xfrm>
+            <a:off x="0" y="772230"/>
+            <a:ext cx="6822830" cy="5495692"/>
+          </a:xfrm>
+          <a:prstGeom prst="rect">
+            <a:avLst/>
+          </a:prstGeom>
+        </p:spPr>
+      </p:pic>
     </p:spTree>
     <p:extLst>
       <p:ext uri="{BB962C8B-B14F-4D97-AF65-F5344CB8AC3E}">

</xml_diff>